<commit_message>
hi just like changed a bit that i should've done in phase 0
</commit_message>
<xml_diff>
--- a/CSC 207 CRC Cards Model.pptx
+++ b/CSC 207 CRC Cards Model.pptx
@@ -276,7 +276,7 @@
           <a:p>
             <a:fld id="{943827C9-442C-EE45-B517-B1C950B5B613}" type="datetimeFigureOut">
               <a:rPr lang="en-US" smtClean="0"/>
-              <a:t>10/16/2021</a:t>
+              <a:t>10/31/2021</a:t>
             </a:fld>
             <a:endParaRPr lang="en-US"/>
           </a:p>
@@ -474,7 +474,7 @@
           <a:p>
             <a:fld id="{943827C9-442C-EE45-B517-B1C950B5B613}" type="datetimeFigureOut">
               <a:rPr lang="en-US" smtClean="0"/>
-              <a:t>10/16/2021</a:t>
+              <a:t>10/31/2021</a:t>
             </a:fld>
             <a:endParaRPr lang="en-US"/>
           </a:p>
@@ -682,7 +682,7 @@
           <a:p>
             <a:fld id="{943827C9-442C-EE45-B517-B1C950B5B613}" type="datetimeFigureOut">
               <a:rPr lang="en-US" smtClean="0"/>
-              <a:t>10/16/2021</a:t>
+              <a:t>10/31/2021</a:t>
             </a:fld>
             <a:endParaRPr lang="en-US"/>
           </a:p>
@@ -880,7 +880,7 @@
           <a:p>
             <a:fld id="{943827C9-442C-EE45-B517-B1C950B5B613}" type="datetimeFigureOut">
               <a:rPr lang="en-US" smtClean="0"/>
-              <a:t>10/16/2021</a:t>
+              <a:t>10/31/2021</a:t>
             </a:fld>
             <a:endParaRPr lang="en-US"/>
           </a:p>
@@ -1155,7 +1155,7 @@
           <a:p>
             <a:fld id="{943827C9-442C-EE45-B517-B1C950B5B613}" type="datetimeFigureOut">
               <a:rPr lang="en-US" smtClean="0"/>
-              <a:t>10/16/2021</a:t>
+              <a:t>10/31/2021</a:t>
             </a:fld>
             <a:endParaRPr lang="en-US"/>
           </a:p>
@@ -1420,7 +1420,7 @@
           <a:p>
             <a:fld id="{943827C9-442C-EE45-B517-B1C950B5B613}" type="datetimeFigureOut">
               <a:rPr lang="en-US" smtClean="0"/>
-              <a:t>10/16/2021</a:t>
+              <a:t>10/31/2021</a:t>
             </a:fld>
             <a:endParaRPr lang="en-US"/>
           </a:p>
@@ -1832,7 +1832,7 @@
           <a:p>
             <a:fld id="{943827C9-442C-EE45-B517-B1C950B5B613}" type="datetimeFigureOut">
               <a:rPr lang="en-US" smtClean="0"/>
-              <a:t>10/16/2021</a:t>
+              <a:t>10/31/2021</a:t>
             </a:fld>
             <a:endParaRPr lang="en-US"/>
           </a:p>
@@ -1973,7 +1973,7 @@
           <a:p>
             <a:fld id="{943827C9-442C-EE45-B517-B1C950B5B613}" type="datetimeFigureOut">
               <a:rPr lang="en-US" smtClean="0"/>
-              <a:t>10/16/2021</a:t>
+              <a:t>10/31/2021</a:t>
             </a:fld>
             <a:endParaRPr lang="en-US"/>
           </a:p>
@@ -2086,7 +2086,7 @@
           <a:p>
             <a:fld id="{943827C9-442C-EE45-B517-B1C950B5B613}" type="datetimeFigureOut">
               <a:rPr lang="en-US" smtClean="0"/>
-              <a:t>10/16/2021</a:t>
+              <a:t>10/31/2021</a:t>
             </a:fld>
             <a:endParaRPr lang="en-US"/>
           </a:p>
@@ -2397,7 +2397,7 @@
           <a:p>
             <a:fld id="{943827C9-442C-EE45-B517-B1C950B5B613}" type="datetimeFigureOut">
               <a:rPr lang="en-US" smtClean="0"/>
-              <a:t>10/16/2021</a:t>
+              <a:t>10/31/2021</a:t>
             </a:fld>
             <a:endParaRPr lang="en-US"/>
           </a:p>
@@ -2685,7 +2685,7 @@
           <a:p>
             <a:fld id="{943827C9-442C-EE45-B517-B1C950B5B613}" type="datetimeFigureOut">
               <a:rPr lang="en-US" smtClean="0"/>
-              <a:t>10/16/2021</a:t>
+              <a:t>10/31/2021</a:t>
             </a:fld>
             <a:endParaRPr lang="en-US"/>
           </a:p>
@@ -2926,7 +2926,7 @@
           <a:p>
             <a:fld id="{943827C9-442C-EE45-B517-B1C950B5B613}" type="datetimeFigureOut">
               <a:rPr lang="en-US" smtClean="0"/>
-              <a:t>10/16/2021</a:t>
+              <a:t>10/31/2021</a:t>
             </a:fld>
             <a:endParaRPr lang="en-US"/>
           </a:p>
@@ -6016,14 +6016,11 @@
             <a:p>
               <a:pPr algn="ctr"/>
               <a:r>
-                <a:rPr lang="en" sz="2400" b="1" err="1">
+                <a:rPr lang="en" sz="2400" b="1" dirty="0">
                   <a:cs typeface="Calibri"/>
                 </a:rPr>
                 <a:t>DataManager</a:t>
               </a:r>
-              <a:endParaRPr lang="en" sz="2400" b="1">
-                <a:cs typeface="Calibri"/>
-              </a:endParaRPr>
             </a:p>
           </p:txBody>
         </p:sp>

</xml_diff>